<commit_message>
automatic submission upon access after effective due date
</commit_message>
<xml_diff>
--- a/test/test_pptx2md.pptx
+++ b/test/test_pptx2md.pptx
@@ -5,7 +5,7 @@
     <p:sldMasterId id="2147483660" r:id="rId1"/>
   </p:sldMasterIdLst>
   <p:notesMasterIdLst>
-    <p:notesMasterId r:id="rId12"/>
+    <p:notesMasterId r:id="rId13"/>
   </p:notesMasterIdLst>
   <p:sldIdLst>
     <p:sldId id="503" r:id="rId2"/>
@@ -17,7 +17,8 @@
     <p:sldId id="700" r:id="rId8"/>
     <p:sldId id="701" r:id="rId9"/>
     <p:sldId id="699" r:id="rId10"/>
-    <p:sldId id="702" r:id="rId11"/>
+    <p:sldId id="703" r:id="rId11"/>
+    <p:sldId id="702" r:id="rId12"/>
   </p:sldIdLst>
   <p:sldSz cx="9144000" cy="6858000" type="screen4x3"/>
   <p:notesSz cx="6858000" cy="9144000"/>
@@ -206,7 +207,7 @@
           <a:p>
             <a:fld id="{A3B2EED6-DB2B-764F-A8A4-2C57DA740FCC}" type="datetimeFigureOut">
               <a:rPr lang="en-US" smtClean="0"/>
-              <a:t>1/13/17</a:t>
+              <a:t>1/15/17</a:t>
             </a:fld>
             <a:endParaRPr lang="en-US"/>
           </a:p>
@@ -528,11 +529,7 @@
             </a:r>
             <a:r>
               <a:rPr lang="en-US" dirty="0" smtClean="0"/>
-              <a:t>-defaults </a:t>
-            </a:r>
-            <a:r>
-              <a:rPr lang="en-US" dirty="0" smtClean="0"/>
-              <a:t>--pace=1 --</a:t>
+              <a:t>-defaults --pace=1 --</a:t>
             </a:r>
             <a:r>
               <a:rPr lang="en-US" dirty="0" smtClean="0">
@@ -573,6 +570,90 @@
     <p:extLst>
       <p:ext uri="{BB962C8B-B14F-4D97-AF65-F5344CB8AC3E}">
         <p14:creationId xmlns:p14="http://schemas.microsoft.com/office/powerpoint/2010/main" val="805831531"/>
+      </p:ext>
+    </p:extLst>
+  </p:cSld>
+  <p:clrMapOvr>
+    <a:masterClrMapping/>
+  </p:clrMapOvr>
+</p:notes>
+</file>
+
+<file path=ppt/notesSlides/notesSlide10.xml><?xml version="1.0" encoding="utf-8"?>
+<p:notes xmlns:a="http://schemas.openxmlformats.org/drawingml/2006/main" xmlns:r="http://schemas.openxmlformats.org/officeDocument/2006/relationships" xmlns:p="http://schemas.openxmlformats.org/presentationml/2006/main">
+  <p:cSld>
+    <p:spTree>
+      <p:nvGrpSpPr>
+        <p:cNvPr id="1" name=""/>
+        <p:cNvGrpSpPr/>
+        <p:nvPr/>
+      </p:nvGrpSpPr>
+      <p:grpSpPr>
+        <a:xfrm>
+          <a:off x="0" y="0"/>
+          <a:ext cx="0" cy="0"/>
+          <a:chOff x="0" y="0"/>
+          <a:chExt cx="0" cy="0"/>
+        </a:xfrm>
+      </p:grpSpPr>
+      <p:sp>
+        <p:nvSpPr>
+          <p:cNvPr id="2" name="Slide Image Placeholder 1"/>
+          <p:cNvSpPr>
+            <a:spLocks noGrp="1" noRot="1" noChangeAspect="1"/>
+          </p:cNvSpPr>
+          <p:nvPr>
+            <p:ph type="sldImg"/>
+          </p:nvPr>
+        </p:nvSpPr>
+        <p:spPr/>
+      </p:sp>
+      <p:sp>
+        <p:nvSpPr>
+          <p:cNvPr id="3" name="Notes Placeholder 2"/>
+          <p:cNvSpPr>
+            <a:spLocks noGrp="1"/>
+          </p:cNvSpPr>
+          <p:nvPr>
+            <p:ph type="body" idx="1"/>
+          </p:nvPr>
+        </p:nvSpPr>
+        <p:spPr/>
+        <p:txBody>
+          <a:bodyPr/>
+          <a:lstStyle/>
+          <a:p>
+            <a:endParaRPr lang="en-US" dirty="0"/>
+          </a:p>
+        </p:txBody>
+      </p:sp>
+      <p:sp>
+        <p:nvSpPr>
+          <p:cNvPr id="4" name="Slide Number Placeholder 3"/>
+          <p:cNvSpPr>
+            <a:spLocks noGrp="1"/>
+          </p:cNvSpPr>
+          <p:nvPr>
+            <p:ph type="sldNum" sz="quarter" idx="10"/>
+          </p:nvPr>
+        </p:nvSpPr>
+        <p:spPr/>
+        <p:txBody>
+          <a:bodyPr/>
+          <a:lstStyle/>
+          <a:p>
+            <a:fld id="{9A0BBAB3-A60F-ED44-B298-CD7CAF8BE3B9}" type="slidenum">
+              <a:rPr lang="en-US" smtClean="0"/>
+              <a:t>11</a:t>
+            </a:fld>
+            <a:endParaRPr lang="en-US"/>
+          </a:p>
+        </p:txBody>
+      </p:sp>
+    </p:spTree>
+    <p:extLst>
+      <p:ext uri="{BB962C8B-B14F-4D97-AF65-F5344CB8AC3E}">
+        <p14:creationId xmlns:p14="http://schemas.microsoft.com/office/powerpoint/2010/main" val="47714829"/>
       </p:ext>
     </p:extLst>
   </p:cSld>
@@ -732,19 +813,18 @@
                 <a:ea typeface="+mn-ea"/>
                 <a:cs typeface="+mn-cs"/>
               </a:rPr>
-              <a:t>&lt;</a:t>
-            </a:r>
-            <a:r>
-              <a:rPr lang="en-US" sz="1200" kern="1200" dirty="0" err="1" smtClean="0">
-                <a:solidFill>
-                  <a:schemeClr val="tx1"/>
-                </a:solidFill>
-                <a:latin typeface="+mn-lt"/>
-                <a:ea typeface="+mn-ea"/>
-                <a:cs typeface="+mn-cs"/>
-              </a:rPr>
-              <a:t>abcd</a:t>
-            </a:r>
+              <a:t>&lt;div&gt;</a:t>
+            </a:r>
+            <a:endParaRPr lang="en-US" sz="1200" kern="1200" dirty="0" smtClean="0">
+              <a:solidFill>
+                <a:schemeClr val="tx1"/>
+              </a:solidFill>
+              <a:latin typeface="+mn-lt"/>
+              <a:ea typeface="+mn-ea"/>
+              <a:cs typeface="+mn-cs"/>
+            </a:endParaRPr>
+          </a:p>
+          <a:p>
             <a:r>
               <a:rPr lang="en-US" sz="1200" kern="1200" dirty="0" smtClean="0">
                 <a:solidFill>
@@ -754,12 +834,12 @@
                 <a:ea typeface="+mn-ea"/>
                 <a:cs typeface="+mn-cs"/>
               </a:rPr>
-              <a:t>&gt;</a:t>
-            </a:r>
-          </a:p>
-          <a:p>
-            <a:r>
-              <a:rPr lang="en-US" sz="1200" kern="1200" dirty="0" smtClean="0">
+              <a:t>&lt;b&gt;HTML&lt;/b&gt;</a:t>
+            </a:r>
+          </a:p>
+          <a:p>
+            <a:r>
+              <a:rPr lang="en-US" sz="1200" kern="1200" smtClean="0">
                 <a:solidFill>
                   <a:schemeClr val="tx1"/>
                 </a:solidFill>
@@ -767,30 +847,18 @@
                 <a:ea typeface="+mn-ea"/>
                 <a:cs typeface="+mn-cs"/>
               </a:rPr>
-              <a:t>&lt;</a:t>
-            </a:r>
-            <a:r>
-              <a:rPr lang="en-US" sz="1200" kern="1200" dirty="0" err="1" smtClean="0">
-                <a:solidFill>
-                  <a:schemeClr val="tx1"/>
-                </a:solidFill>
-                <a:latin typeface="+mn-lt"/>
-                <a:ea typeface="+mn-ea"/>
-                <a:cs typeface="+mn-cs"/>
-              </a:rPr>
-              <a:t>efg</a:t>
-            </a:r>
-            <a:r>
-              <a:rPr lang="en-US" sz="1200" kern="1200" dirty="0" smtClean="0">
-                <a:solidFill>
-                  <a:schemeClr val="tx1"/>
-                </a:solidFill>
-                <a:latin typeface="+mn-lt"/>
-                <a:ea typeface="+mn-ea"/>
-                <a:cs typeface="+mn-cs"/>
-              </a:rPr>
-              <a:t>&gt;</a:t>
-            </a:r>
+              <a:t>&lt;/div&gt;</a:t>
+            </a:r>
+          </a:p>
+          <a:p>
+            <a:endParaRPr lang="en-US" sz="1200" kern="1200" dirty="0" smtClean="0">
+              <a:solidFill>
+                <a:schemeClr val="tx1"/>
+              </a:solidFill>
+              <a:latin typeface="+mn-lt"/>
+              <a:ea typeface="+mn-ea"/>
+              <a:cs typeface="+mn-cs"/>
+            </a:endParaRPr>
           </a:p>
           <a:p>
             <a:endParaRPr lang="en-US" sz="1200" kern="1200" dirty="0" smtClean="0">
@@ -1387,7 +1455,7 @@
     </p:spTree>
     <p:extLst>
       <p:ext uri="{BB962C8B-B14F-4D97-AF65-F5344CB8AC3E}">
-        <p14:creationId xmlns:p14="http://schemas.microsoft.com/office/powerpoint/2010/main" val="47714829"/>
+        <p14:creationId xmlns:p14="http://schemas.microsoft.com/office/powerpoint/2010/main" val="1776900585"/>
       </p:ext>
     </p:extLst>
   </p:cSld>
@@ -1528,7 +1596,7 @@
           <a:p>
             <a:fld id="{14166C67-5CB2-8A44-BF4C-A34923C2F8A5}" type="datetimeFigureOut">
               <a:rPr lang="en-US" smtClean="0"/>
-              <a:t>1/13/17</a:t>
+              <a:t>1/15/17</a:t>
             </a:fld>
             <a:endParaRPr lang="en-US"/>
           </a:p>
@@ -1698,7 +1766,7 @@
           <a:p>
             <a:fld id="{14166C67-5CB2-8A44-BF4C-A34923C2F8A5}" type="datetimeFigureOut">
               <a:rPr lang="en-US" smtClean="0"/>
-              <a:t>1/13/17</a:t>
+              <a:t>1/15/17</a:t>
             </a:fld>
             <a:endParaRPr lang="en-US"/>
           </a:p>
@@ -1878,7 +1946,7 @@
           <a:p>
             <a:fld id="{14166C67-5CB2-8A44-BF4C-A34923C2F8A5}" type="datetimeFigureOut">
               <a:rPr lang="en-US" smtClean="0"/>
-              <a:t>1/13/17</a:t>
+              <a:t>1/15/17</a:t>
             </a:fld>
             <a:endParaRPr lang="en-US"/>
           </a:p>
@@ -2048,7 +2116,7 @@
           <a:p>
             <a:fld id="{14166C67-5CB2-8A44-BF4C-A34923C2F8A5}" type="datetimeFigureOut">
               <a:rPr lang="en-US" smtClean="0"/>
-              <a:t>1/13/17</a:t>
+              <a:t>1/15/17</a:t>
             </a:fld>
             <a:endParaRPr lang="en-US"/>
           </a:p>
@@ -2292,7 +2360,7 @@
           <a:p>
             <a:fld id="{14166C67-5CB2-8A44-BF4C-A34923C2F8A5}" type="datetimeFigureOut">
               <a:rPr lang="en-US" smtClean="0"/>
-              <a:t>1/13/17</a:t>
+              <a:t>1/15/17</a:t>
             </a:fld>
             <a:endParaRPr lang="en-US"/>
           </a:p>
@@ -2524,7 +2592,7 @@
           <a:p>
             <a:fld id="{14166C67-5CB2-8A44-BF4C-A34923C2F8A5}" type="datetimeFigureOut">
               <a:rPr lang="en-US" smtClean="0"/>
-              <a:t>1/13/17</a:t>
+              <a:t>1/15/17</a:t>
             </a:fld>
             <a:endParaRPr lang="en-US"/>
           </a:p>
@@ -2891,7 +2959,7 @@
           <a:p>
             <a:fld id="{14166C67-5CB2-8A44-BF4C-A34923C2F8A5}" type="datetimeFigureOut">
               <a:rPr lang="en-US" smtClean="0"/>
-              <a:t>1/13/17</a:t>
+              <a:t>1/15/17</a:t>
             </a:fld>
             <a:endParaRPr lang="en-US"/>
           </a:p>
@@ -3009,7 +3077,7 @@
           <a:p>
             <a:fld id="{14166C67-5CB2-8A44-BF4C-A34923C2F8A5}" type="datetimeFigureOut">
               <a:rPr lang="en-US" smtClean="0"/>
-              <a:t>1/13/17</a:t>
+              <a:t>1/15/17</a:t>
             </a:fld>
             <a:endParaRPr lang="en-US"/>
           </a:p>
@@ -3104,7 +3172,7 @@
           <a:p>
             <a:fld id="{14166C67-5CB2-8A44-BF4C-A34923C2F8A5}" type="datetimeFigureOut">
               <a:rPr lang="en-US" smtClean="0"/>
-              <a:t>1/13/17</a:t>
+              <a:t>1/15/17</a:t>
             </a:fld>
             <a:endParaRPr lang="en-US"/>
           </a:p>
@@ -3381,7 +3449,7 @@
           <a:p>
             <a:fld id="{14166C67-5CB2-8A44-BF4C-A34923C2F8A5}" type="datetimeFigureOut">
               <a:rPr lang="en-US" smtClean="0"/>
-              <a:t>1/13/17</a:t>
+              <a:t>1/15/17</a:t>
             </a:fld>
             <a:endParaRPr lang="en-US"/>
           </a:p>
@@ -3638,7 +3706,7 @@
           <a:p>
             <a:fld id="{14166C67-5CB2-8A44-BF4C-A34923C2F8A5}" type="datetimeFigureOut">
               <a:rPr lang="en-US" smtClean="0"/>
-              <a:t>1/13/17</a:t>
+              <a:t>1/15/17</a:t>
             </a:fld>
             <a:endParaRPr lang="en-US"/>
           </a:p>
@@ -3851,7 +3919,7 @@
           <a:p>
             <a:fld id="{14166C67-5CB2-8A44-BF4C-A34923C2F8A5}" type="datetimeFigureOut">
               <a:rPr lang="en-US" smtClean="0"/>
-              <a:t>1/13/17</a:t>
+              <a:t>1/15/17</a:t>
             </a:fld>
             <a:endParaRPr lang="en-US"/>
           </a:p>
@@ -4428,6 +4496,129 @@
 </file>
 
 <file path=ppt/slides/slide10.xml><?xml version="1.0" encoding="utf-8"?>
+<p:sld xmlns:a="http://schemas.openxmlformats.org/drawingml/2006/main" xmlns:r="http://schemas.openxmlformats.org/officeDocument/2006/relationships" xmlns:p="http://schemas.openxmlformats.org/presentationml/2006/main">
+  <p:cSld>
+    <p:spTree>
+      <p:nvGrpSpPr>
+        <p:cNvPr id="1" name=""/>
+        <p:cNvGrpSpPr/>
+        <p:nvPr/>
+      </p:nvGrpSpPr>
+      <p:grpSpPr>
+        <a:xfrm>
+          <a:off x="0" y="0"/>
+          <a:ext cx="0" cy="0"/>
+          <a:chOff x="0" y="0"/>
+          <a:chExt cx="0" cy="0"/>
+        </a:xfrm>
+      </p:grpSpPr>
+      <p:sp>
+        <p:nvSpPr>
+          <p:cNvPr id="2" name="Title 1"/>
+          <p:cNvSpPr>
+            <a:spLocks noGrp="1"/>
+          </p:cNvSpPr>
+          <p:nvPr>
+            <p:ph type="title"/>
+          </p:nvPr>
+        </p:nvSpPr>
+        <p:spPr/>
+        <p:txBody>
+          <a:bodyPr>
+            <a:normAutofit/>
+          </a:bodyPr>
+          <a:lstStyle/>
+          <a:p>
+            <a:r>
+              <a:rPr lang="en-US" sz="3600" dirty="0" smtClean="0"/>
+              <a:t>Present </a:t>
+            </a:r>
+            <a:r>
+              <a:rPr lang="en-US" sz="3600" dirty="0" smtClean="0"/>
+              <a:t>value of </a:t>
+            </a:r>
+            <a:r>
+              <a:rPr lang="en-US" sz="3600" dirty="0" smtClean="0"/>
+              <a:t>$1 in climate damages</a:t>
+            </a:r>
+            <a:endParaRPr lang="en-US" sz="3600" dirty="0"/>
+          </a:p>
+        </p:txBody>
+      </p:sp>
+      <p:sp>
+        <p:nvSpPr>
+          <p:cNvPr id="3" name="Content Placeholder 2"/>
+          <p:cNvSpPr>
+            <a:spLocks noGrp="1"/>
+          </p:cNvSpPr>
+          <p:nvPr>
+            <p:ph idx="1"/>
+          </p:nvPr>
+        </p:nvSpPr>
+        <p:spPr/>
+        <p:txBody>
+          <a:bodyPr/>
+          <a:lstStyle/>
+          <a:p>
+            <a:endParaRPr lang="en-US" dirty="0"/>
+          </a:p>
+        </p:txBody>
+      </p:sp>
+      <p:pic>
+        <p:nvPicPr>
+          <p:cNvPr id="4" name="Picture 3" descr="Dessler_Fig"/>
+          <p:cNvPicPr>
+            <a:picLocks noChangeAspect="1" noChangeArrowheads="1"/>
+          </p:cNvPicPr>
+          <p:nvPr/>
+        </p:nvPicPr>
+        <p:blipFill>
+          <a:blip r:embed="rId3">
+            <a:extLst>
+              <a:ext uri="{28A0092B-C50C-407E-A947-70E740481C1C}">
+                <a14:useLocalDpi xmlns:a14="http://schemas.microsoft.com/office/drawing/2010/main" val="0"/>
+              </a:ext>
+            </a:extLst>
+          </a:blip>
+          <a:srcRect/>
+          <a:stretch>
+            <a:fillRect/>
+          </a:stretch>
+        </p:blipFill>
+        <p:spPr bwMode="auto">
+          <a:xfrm>
+            <a:off x="1687181" y="1690689"/>
+            <a:ext cx="4906187" cy="3979863"/>
+          </a:xfrm>
+          <a:prstGeom prst="rect">
+            <a:avLst/>
+          </a:prstGeom>
+          <a:noFill/>
+          <a:extLst>
+            <a:ext uri="{909E8E84-426E-40DD-AFC4-6F175D3DCCD1}">
+              <a14:hiddenFill xmlns:a14="http://schemas.microsoft.com/office/drawing/2010/main">
+                <a:solidFill>
+                  <a:srgbClr val="FFFFFF"/>
+                </a:solidFill>
+              </a14:hiddenFill>
+            </a:ext>
+          </a:extLst>
+        </p:spPr>
+      </p:pic>
+    </p:spTree>
+    <p:extLst>
+      <p:ext uri="{BB962C8B-B14F-4D97-AF65-F5344CB8AC3E}">
+        <p14:creationId xmlns:p14="http://schemas.microsoft.com/office/powerpoint/2010/main" val="626449797"/>
+      </p:ext>
+    </p:extLst>
+  </p:cSld>
+  <p:clrMapOvr>
+    <a:masterClrMapping/>
+  </p:clrMapOvr>
+</p:sld>
+</file>
+
+<file path=ppt/slides/slide11.xml><?xml version="1.0" encoding="utf-8"?>
 <p:sld xmlns:a="http://schemas.openxmlformats.org/drawingml/2006/main" xmlns:r="http://schemas.openxmlformats.org/officeDocument/2006/relationships" xmlns:p="http://schemas.openxmlformats.org/presentationml/2006/main">
   <p:cSld>
     <p:spTree>

</xml_diff>